<commit_message>
listo para clase 5: interacciones
</commit_message>
<xml_diff>
--- a/LiceoContextual/taller_rob.pptx
+++ b/LiceoContextual/taller_rob.pptx
@@ -207,14 +207,6 @@
           <pc:docMk/>
           <pc:sldMk cId="3405084184" sldId="256"/>
         </pc:sldMkLst>
-        <pc:spChg chg="mod">
-          <ac:chgData name="Castiello de Obeso, Santiago" userId="b4fc0b8e-1f0e-417a-8aad-015961d2398a" providerId="ADAL" clId="{8CB40BA0-C2B8-4601-8C06-CFD421284BF1}" dt="2025-01-18T16:17:49.345" v="9" actId="6549"/>
-          <ac:spMkLst>
-            <pc:docMk/>
-            <pc:sldMk cId="3405084184" sldId="256"/>
-            <ac:spMk id="8" creationId="{3D3A654C-98A9-40A6-BCA9-6C6E2E2CEC75}"/>
-          </ac:spMkLst>
-        </pc:spChg>
       </pc:sldChg>
       <pc:sldChg chg="ord">
         <pc:chgData name="Castiello de Obeso, Santiago" userId="b4fc0b8e-1f0e-417a-8aad-015961d2398a" providerId="ADAL" clId="{8CB40BA0-C2B8-4601-8C06-CFD421284BF1}" dt="2024-11-30T16:35:30.529" v="1"/>
@@ -2347,6 +2339,30 @@
           <pc:docMk/>
           <pc:sldMk cId="2571077277" sldId="668"/>
         </pc:sldMkLst>
+      </pc:sldChg>
+    </pc:docChg>
+  </pc:docChgLst>
+  <pc:docChgLst>
+    <pc:chgData name="Castiello de Obeso, Santiago" userId="b4fc0b8e-1f0e-417a-8aad-015961d2398a" providerId="ADAL" clId="{B30D07D9-8BCC-47D1-9208-19899604CE36}"/>
+    <pc:docChg chg="modSld">
+      <pc:chgData name="Castiello de Obeso, Santiago" userId="b4fc0b8e-1f0e-417a-8aad-015961d2398a" providerId="ADAL" clId="{B30D07D9-8BCC-47D1-9208-19899604CE36}" dt="2025-06-14T13:54:22.099" v="7" actId="6549"/>
+      <pc:docMkLst>
+        <pc:docMk/>
+      </pc:docMkLst>
+      <pc:sldChg chg="modSp mod">
+        <pc:chgData name="Castiello de Obeso, Santiago" userId="b4fc0b8e-1f0e-417a-8aad-015961d2398a" providerId="ADAL" clId="{B30D07D9-8BCC-47D1-9208-19899604CE36}" dt="2025-06-14T13:54:22.099" v="7" actId="6549"/>
+        <pc:sldMkLst>
+          <pc:docMk/>
+          <pc:sldMk cId="3405084184" sldId="256"/>
+        </pc:sldMkLst>
+        <pc:spChg chg="mod">
+          <ac:chgData name="Castiello de Obeso, Santiago" userId="b4fc0b8e-1f0e-417a-8aad-015961d2398a" providerId="ADAL" clId="{B30D07D9-8BCC-47D1-9208-19899604CE36}" dt="2025-06-14T13:54:22.099" v="7" actId="6549"/>
+          <ac:spMkLst>
+            <pc:docMk/>
+            <pc:sldMk cId="3405084184" sldId="256"/>
+            <ac:spMk id="8" creationId="{3D3A654C-98A9-40A6-BCA9-6C6E2E2CEC75}"/>
+          </ac:spMkLst>
+        </pc:spChg>
       </pc:sldChg>
     </pc:docChg>
   </pc:docChgLst>
@@ -2435,7 +2451,7 @@
           <a:p>
             <a:fld id="{915EF737-7D08-41F1-8E81-629EB7438791}" type="datetimeFigureOut">
               <a:rPr lang="en-US" smtClean="0"/>
-              <a:t>1/18/2025</a:t>
+              <a:t>6/14/2025</a:t>
             </a:fld>
             <a:endParaRPr lang="en-US"/>
           </a:p>
@@ -2915,7 +2931,7 @@
           <a:p>
             <a:fld id="{401857E1-268D-4A19-81B1-DBBE8B3C9127}" type="datetimeFigureOut">
               <a:rPr lang="en-US" smtClean="0"/>
-              <a:t>1/18/2025</a:t>
+              <a:t>6/14/2025</a:t>
             </a:fld>
             <a:endParaRPr lang="en-US"/>
           </a:p>
@@ -3083,7 +3099,7 @@
           <a:p>
             <a:fld id="{401857E1-268D-4A19-81B1-DBBE8B3C9127}" type="datetimeFigureOut">
               <a:rPr lang="en-US" smtClean="0"/>
-              <a:t>1/18/2025</a:t>
+              <a:t>6/14/2025</a:t>
             </a:fld>
             <a:endParaRPr lang="en-US"/>
           </a:p>
@@ -3261,7 +3277,7 @@
           <a:p>
             <a:fld id="{401857E1-268D-4A19-81B1-DBBE8B3C9127}" type="datetimeFigureOut">
               <a:rPr lang="en-US" smtClean="0"/>
-              <a:t>1/18/2025</a:t>
+              <a:t>6/14/2025</a:t>
             </a:fld>
             <a:endParaRPr lang="en-US"/>
           </a:p>
@@ -3429,7 +3445,7 @@
           <a:p>
             <a:fld id="{401857E1-268D-4A19-81B1-DBBE8B3C9127}" type="datetimeFigureOut">
               <a:rPr lang="en-US" smtClean="0"/>
-              <a:t>1/18/2025</a:t>
+              <a:t>6/14/2025</a:t>
             </a:fld>
             <a:endParaRPr lang="en-US"/>
           </a:p>
@@ -3674,7 +3690,7 @@
           <a:p>
             <a:fld id="{401857E1-268D-4A19-81B1-DBBE8B3C9127}" type="datetimeFigureOut">
               <a:rPr lang="en-US" smtClean="0"/>
-              <a:t>1/18/2025</a:t>
+              <a:t>6/14/2025</a:t>
             </a:fld>
             <a:endParaRPr lang="en-US"/>
           </a:p>
@@ -3903,7 +3919,7 @@
           <a:p>
             <a:fld id="{401857E1-268D-4A19-81B1-DBBE8B3C9127}" type="datetimeFigureOut">
               <a:rPr lang="en-US" smtClean="0"/>
-              <a:t>1/18/2025</a:t>
+              <a:t>6/14/2025</a:t>
             </a:fld>
             <a:endParaRPr lang="en-US"/>
           </a:p>
@@ -4267,7 +4283,7 @@
           <a:p>
             <a:fld id="{401857E1-268D-4A19-81B1-DBBE8B3C9127}" type="datetimeFigureOut">
               <a:rPr lang="en-US" smtClean="0"/>
-              <a:t>1/18/2025</a:t>
+              <a:t>6/14/2025</a:t>
             </a:fld>
             <a:endParaRPr lang="en-US"/>
           </a:p>
@@ -4384,7 +4400,7 @@
           <a:p>
             <a:fld id="{401857E1-268D-4A19-81B1-DBBE8B3C9127}" type="datetimeFigureOut">
               <a:rPr lang="en-US" smtClean="0"/>
-              <a:t>1/18/2025</a:t>
+              <a:t>6/14/2025</a:t>
             </a:fld>
             <a:endParaRPr lang="en-US"/>
           </a:p>
@@ -4479,7 +4495,7 @@
           <a:p>
             <a:fld id="{401857E1-268D-4A19-81B1-DBBE8B3C9127}" type="datetimeFigureOut">
               <a:rPr lang="en-US" smtClean="0"/>
-              <a:t>1/18/2025</a:t>
+              <a:t>6/14/2025</a:t>
             </a:fld>
             <a:endParaRPr lang="en-US"/>
           </a:p>
@@ -4754,7 +4770,7 @@
           <a:p>
             <a:fld id="{401857E1-268D-4A19-81B1-DBBE8B3C9127}" type="datetimeFigureOut">
               <a:rPr lang="en-US" smtClean="0"/>
-              <a:t>1/18/2025</a:t>
+              <a:t>6/14/2025</a:t>
             </a:fld>
             <a:endParaRPr lang="en-US"/>
           </a:p>
@@ -5006,7 +5022,7 @@
           <a:p>
             <a:fld id="{401857E1-268D-4A19-81B1-DBBE8B3C9127}" type="datetimeFigureOut">
               <a:rPr lang="en-US" smtClean="0"/>
-              <a:t>1/18/2025</a:t>
+              <a:t>6/14/2025</a:t>
             </a:fld>
             <a:endParaRPr lang="en-US"/>
           </a:p>
@@ -5217,7 +5233,7 @@
           <a:p>
             <a:fld id="{401857E1-268D-4A19-81B1-DBBE8B3C9127}" type="datetimeFigureOut">
               <a:rPr lang="en-US" smtClean="0"/>
-              <a:t>1/18/2025</a:t>
+              <a:t>6/14/2025</a:t>
             </a:fld>
             <a:endParaRPr lang="en-US"/>
           </a:p>
@@ -5764,7 +5780,7 @@
                   <a:schemeClr val="bg1"/>
                 </a:solidFill>
               </a:rPr>
-              <a:t>18/01/2025</a:t>
+              <a:t>14/06/2025</a:t>
             </a:r>
           </a:p>
           <a:p>

</xml_diff>